<commit_message>
added a note in powerpoint
</commit_message>
<xml_diff>
--- a/Presentation.pptx
+++ b/Presentation.pptx
@@ -136,7 +136,7 @@
   <pc:docChgLst>
     <pc:chgData name="pamela hinostroza" userId="c80913c5e854edc0" providerId="LiveId" clId="{E818F365-D871-47E4-AC3E-C2A795DBC77B}"/>
     <pc:docChg chg="undo redo custSel addSld delSld modSld sldOrd">
-      <pc:chgData name="pamela hinostroza" userId="c80913c5e854edc0" providerId="LiveId" clId="{E818F365-D871-47E4-AC3E-C2A795DBC77B}" dt="2021-03-18T00:24:53.556" v="3203" actId="20577"/>
+      <pc:chgData name="pamela hinostroza" userId="c80913c5e854edc0" providerId="LiveId" clId="{E818F365-D871-47E4-AC3E-C2A795DBC77B}" dt="2021-03-18T01:10:57.434" v="3274" actId="20577"/>
       <pc:docMkLst>
         <pc:docMk/>
       </pc:docMkLst>
@@ -773,7 +773,7 @@
         </pc:picChg>
       </pc:sldChg>
       <pc:sldChg chg="addSp modSp new mod ord modNotesTx">
-        <pc:chgData name="pamela hinostroza" userId="c80913c5e854edc0" providerId="LiveId" clId="{E818F365-D871-47E4-AC3E-C2A795DBC77B}" dt="2021-03-18T00:24:53.556" v="3203" actId="20577"/>
+        <pc:chgData name="pamela hinostroza" userId="c80913c5e854edc0" providerId="LiveId" clId="{E818F365-D871-47E4-AC3E-C2A795DBC77B}" dt="2021-03-18T01:10:57.434" v="3274" actId="20577"/>
         <pc:sldMkLst>
           <pc:docMk/>
           <pc:sldMk cId="1655545423" sldId="273"/>
@@ -5654,7 +5654,7 @@
             </a:r>
             <a:r>
               <a:rPr lang="en-US" dirty="0"/>
-              <a:t> **adding replace instead of append so it can be re-run if necessary**</a:t>
+              <a:t> **adding replace instead of append so it can be re-run if necessary/table that lends out foreign key is listed last to avoid error**</a:t>
             </a:r>
           </a:p>
         </p:txBody>

</xml_diff>

<commit_message>
links for websites added
</commit_message>
<xml_diff>
--- a/Presentation.pptx
+++ b/Presentation.pptx
@@ -127,7 +127,7 @@
 <file path=ppt/revisionInfo.xml><?xml version="1.0" encoding="utf-8"?>
 <p1510:revInfo xmlns:a="http://schemas.openxmlformats.org/drawingml/2006/main" xmlns:r="http://schemas.openxmlformats.org/officeDocument/2006/relationships" xmlns:p1510="http://schemas.microsoft.com/office/powerpoint/2015/10/main">
   <p1510:revLst>
-    <p1510:client id="{E818F365-D871-47E4-AC3E-C2A795DBC77B}" v="339" dt="2021-03-18T03:39:48.298"/>
+    <p1510:client id="{E818F365-D871-47E4-AC3E-C2A795DBC77B}" v="344" dt="2021-03-18T03:53:08.755"/>
   </p1510:revLst>
 </p1510:revInfo>
 </file>
@@ -1853,9 +1853,12 @@
         <a:lstStyle/>
         <a:p>
           <a:r>
-            <a:rPr lang="en-US" sz="2400" dirty="0"/>
+            <a:rPr lang="en-US" sz="2400" dirty="0">
+              <a:hlinkClick xmlns:r="http://schemas.openxmlformats.org/officeDocument/2006/relationships" r:id="rId1"/>
+            </a:rPr>
             <a:t>Median household income</a:t>
           </a:r>
+          <a:endParaRPr lang="en-US" sz="2400" dirty="0"/>
         </a:p>
       </dgm:t>
     </dgm:pt>
@@ -1941,9 +1944,12 @@
         <a:lstStyle/>
         <a:p>
           <a:r>
-            <a:rPr lang="en-US" sz="2400" dirty="0"/>
+            <a:rPr lang="en-US" sz="2400" dirty="0">
+              <a:hlinkClick xmlns:r="http://schemas.openxmlformats.org/officeDocument/2006/relationships" r:id="rId2"/>
+            </a:rPr>
             <a:t>Median home prices</a:t>
           </a:r>
+          <a:endParaRPr lang="en-US" sz="2400" dirty="0"/>
         </a:p>
       </dgm:t>
     </dgm:pt>
@@ -1988,9 +1994,12 @@
         <a:lstStyle/>
         <a:p>
           <a:r>
-            <a:rPr lang="en-US" sz="2400" dirty="0"/>
+            <a:rPr lang="en-US" sz="2400" dirty="0">
+              <a:hlinkClick xmlns:r="http://schemas.openxmlformats.org/officeDocument/2006/relationships" r:id="rId3"/>
+            </a:rPr>
             <a:t>Cost of living index</a:t>
           </a:r>
+          <a:endParaRPr lang="en-US" sz="2400" dirty="0"/>
         </a:p>
       </dgm:t>
     </dgm:pt>
@@ -2555,9 +2564,12 @@
             <a:buNone/>
           </a:pPr>
           <a:r>
-            <a:rPr lang="en-US" sz="2400" kern="1200" dirty="0"/>
+            <a:rPr lang="en-US" sz="2400" kern="1200" dirty="0">
+              <a:hlinkClick xmlns:r="http://schemas.openxmlformats.org/officeDocument/2006/relationships" r:id="rId1"/>
+            </a:rPr>
             <a:t>Cost of living index</a:t>
           </a:r>
+          <a:endParaRPr lang="en-US" sz="2400" kern="1200" dirty="0"/>
         </a:p>
       </dsp:txBody>
       <dsp:txXfrm>
@@ -2618,9 +2630,12 @@
             <a:buNone/>
           </a:pPr>
           <a:r>
-            <a:rPr lang="en-US" sz="2400" kern="1200" dirty="0"/>
+            <a:rPr lang="en-US" sz="2400" kern="1200" dirty="0">
+              <a:hlinkClick xmlns:r="http://schemas.openxmlformats.org/officeDocument/2006/relationships" r:id="rId2"/>
+            </a:rPr>
             <a:t>Median home prices</a:t>
           </a:r>
+          <a:endParaRPr lang="en-US" sz="2400" kern="1200" dirty="0"/>
         </a:p>
       </dsp:txBody>
       <dsp:txXfrm>
@@ -2744,9 +2759,12 @@
             <a:buNone/>
           </a:pPr>
           <a:r>
-            <a:rPr lang="en-US" sz="2400" kern="1200" dirty="0"/>
+            <a:rPr lang="en-US" sz="2400" kern="1200" dirty="0">
+              <a:hlinkClick xmlns:r="http://schemas.openxmlformats.org/officeDocument/2006/relationships" r:id="rId3"/>
+            </a:rPr>
             <a:t>Median household income</a:t>
           </a:r>
+          <a:endParaRPr lang="en-US" sz="2400" kern="1200" dirty="0"/>
         </a:p>
       </dsp:txBody>
       <dsp:txXfrm>
@@ -13688,7 +13706,7 @@
             <p:ph idx="1"/>
             <p:extLst>
               <p:ext uri="{D42A27DB-BD31-4B8C-83A1-F6EECF244321}">
-                <p14:modId xmlns:p14="http://schemas.microsoft.com/office/powerpoint/2010/main" val="4121037142"/>
+                <p14:modId xmlns:p14="http://schemas.microsoft.com/office/powerpoint/2010/main" val="3215226006"/>
               </p:ext>
             </p:extLst>
           </p:nvPr>

</xml_diff>